<commit_message>
BIG UPDATE before Session 8
</commit_message>
<xml_diff>
--- a/Locations/Helmfield/Helmfield Locations.pptx
+++ b/Locations/Helmfield/Helmfield Locations.pptx
@@ -10,6 +10,9 @@
   <p:sldIdLst>
     <p:sldId id="256" r:id="rId6"/>
     <p:sldId id="257" r:id="rId7"/>
+    <p:sldId id="258" r:id="rId8"/>
+    <p:sldId id="259" r:id="rId9"/>
+    <p:sldId id="260" r:id="rId10"/>
   </p:sldIdLst>
   <p:sldSz cy="5143500" cx="9144000"/>
   <p:notesSz cx="6858000" cy="9144000"/>
@@ -772,7 +775,72 @@
               <a:buNone/>
             </a:pPr>
             <a:r>
-              <a:t/>
+              <a:rPr lang="en"/>
+              <a:t>1 - Town Square</a:t>
+            </a:r>
+            <a:endParaRPr/>
+          </a:p>
+          <a:p>
+            <a:pPr indent="0" lvl="0" marL="0" rtl="0" algn="l">
+              <a:spcBef>
+                <a:spcPts val="0"/>
+              </a:spcBef>
+              <a:spcAft>
+                <a:spcPts val="0"/>
+              </a:spcAft>
+              <a:buNone/>
+            </a:pPr>
+            <a:r>
+              <a:rPr lang="en"/>
+              <a:t>2 - The Moon Market</a:t>
+            </a:r>
+            <a:endParaRPr/>
+          </a:p>
+          <a:p>
+            <a:pPr indent="0" lvl="0" marL="0" rtl="0" algn="l">
+              <a:spcBef>
+                <a:spcPts val="0"/>
+              </a:spcBef>
+              <a:spcAft>
+                <a:spcPts val="0"/>
+              </a:spcAft>
+              <a:buNone/>
+            </a:pPr>
+            <a:r>
+              <a:rPr lang="en"/>
+              <a:t>3 - The Thoughtful Baker Bar</a:t>
+            </a:r>
+            <a:endParaRPr/>
+          </a:p>
+          <a:p>
+            <a:pPr indent="0" lvl="0" marL="0" rtl="0" algn="l">
+              <a:spcBef>
+                <a:spcPts val="0"/>
+              </a:spcBef>
+              <a:spcAft>
+                <a:spcPts val="0"/>
+              </a:spcAft>
+              <a:buNone/>
+            </a:pPr>
+            <a:r>
+              <a:rPr lang="en"/>
+              <a:t>4 - The Flowing Hammer</a:t>
+            </a:r>
+            <a:endParaRPr/>
+          </a:p>
+          <a:p>
+            <a:pPr indent="0" lvl="0" marL="0" rtl="0" algn="l">
+              <a:spcBef>
+                <a:spcPts val="0"/>
+              </a:spcBef>
+              <a:spcAft>
+                <a:spcPts val="0"/>
+              </a:spcAft>
+              <a:buNone/>
+            </a:pPr>
+            <a:r>
+              <a:rPr lang="en"/>
+              <a:t>5 - Day Dream Library </a:t>
             </a:r>
             <a:endParaRPr/>
           </a:p>
@@ -805,7 +873,7 @@
       </p:grpSpPr>
       <p:sp>
         <p:nvSpPr>
-          <p:cNvPr id="56" name="Google Shape;56;g144dc884cc1_0_46:notes"/>
+          <p:cNvPr id="56" name="Google Shape;56;g165300ffa59_0_0:notes"/>
           <p:cNvSpPr/>
           <p:nvPr>
             <p:ph idx="2" type="sldImg"/>
@@ -840,7 +908,7 @@
       </p:sp>
       <p:sp>
         <p:nvSpPr>
-          <p:cNvPr id="57" name="Google Shape;57;g144dc884cc1_0_46:notes"/>
+          <p:cNvPr id="57" name="Google Shape;57;g165300ffa59_0_0:notes"/>
           <p:cNvSpPr txBox="1"/>
           <p:nvPr>
             <p:ph idx="1" type="body"/>
@@ -868,10 +936,811 @@
               <a:spcAft>
                 <a:spcPts val="0"/>
               </a:spcAft>
+              <a:buClr>
+                <a:schemeClr val="dk1"/>
+              </a:buClr>
+              <a:buSzPts val="1100"/>
+              <a:buFont typeface="Arial"/>
               <a:buNone/>
             </a:pPr>
             <a:r>
-              <a:t/>
+              <a:rPr lang="en">
+                <a:solidFill>
+                  <a:schemeClr val="dk1"/>
+                </a:solidFill>
+              </a:rPr>
+              <a:t>1 - Town Square</a:t>
+            </a:r>
+            <a:endParaRPr>
+              <a:solidFill>
+                <a:schemeClr val="dk1"/>
+              </a:solidFill>
+            </a:endParaRPr>
+          </a:p>
+          <a:p>
+            <a:pPr indent="0" lvl="0" marL="0" rtl="0" algn="l">
+              <a:spcBef>
+                <a:spcPts val="0"/>
+              </a:spcBef>
+              <a:spcAft>
+                <a:spcPts val="0"/>
+              </a:spcAft>
+              <a:buClr>
+                <a:schemeClr val="dk1"/>
+              </a:buClr>
+              <a:buSzPts val="1100"/>
+              <a:buFont typeface="Arial"/>
+              <a:buNone/>
+            </a:pPr>
+            <a:r>
+              <a:rPr lang="en">
+                <a:solidFill>
+                  <a:schemeClr val="dk1"/>
+                </a:solidFill>
+              </a:rPr>
+              <a:t>2 - The Moon Market</a:t>
+            </a:r>
+            <a:endParaRPr>
+              <a:solidFill>
+                <a:schemeClr val="dk1"/>
+              </a:solidFill>
+            </a:endParaRPr>
+          </a:p>
+          <a:p>
+            <a:pPr indent="0" lvl="0" marL="0" rtl="0" algn="l">
+              <a:spcBef>
+                <a:spcPts val="0"/>
+              </a:spcBef>
+              <a:spcAft>
+                <a:spcPts val="0"/>
+              </a:spcAft>
+              <a:buClr>
+                <a:schemeClr val="dk1"/>
+              </a:buClr>
+              <a:buSzPts val="1100"/>
+              <a:buFont typeface="Arial"/>
+              <a:buNone/>
+            </a:pPr>
+            <a:r>
+              <a:rPr lang="en">
+                <a:solidFill>
+                  <a:schemeClr val="dk1"/>
+                </a:solidFill>
+              </a:rPr>
+              <a:t>3 - The Thoughtful Baker Bar</a:t>
+            </a:r>
+            <a:endParaRPr>
+              <a:solidFill>
+                <a:schemeClr val="dk1"/>
+              </a:solidFill>
+            </a:endParaRPr>
+          </a:p>
+          <a:p>
+            <a:pPr indent="0" lvl="0" marL="0" rtl="0" algn="l">
+              <a:spcBef>
+                <a:spcPts val="0"/>
+              </a:spcBef>
+              <a:spcAft>
+                <a:spcPts val="0"/>
+              </a:spcAft>
+              <a:buClr>
+                <a:schemeClr val="dk1"/>
+              </a:buClr>
+              <a:buSzPts val="1100"/>
+              <a:buFont typeface="Arial"/>
+              <a:buNone/>
+            </a:pPr>
+            <a:r>
+              <a:rPr lang="en">
+                <a:solidFill>
+                  <a:schemeClr val="dk1"/>
+                </a:solidFill>
+              </a:rPr>
+              <a:t>4 - The Flowing Hammer</a:t>
+            </a:r>
+            <a:endParaRPr>
+              <a:solidFill>
+                <a:schemeClr val="dk1"/>
+              </a:solidFill>
+            </a:endParaRPr>
+          </a:p>
+          <a:p>
+            <a:pPr indent="0" lvl="0" marL="0" rtl="0" algn="l">
+              <a:spcBef>
+                <a:spcPts val="0"/>
+              </a:spcBef>
+              <a:spcAft>
+                <a:spcPts val="0"/>
+              </a:spcAft>
+              <a:buClr>
+                <a:schemeClr val="dk1"/>
+              </a:buClr>
+              <a:buSzPts val="1100"/>
+              <a:buFont typeface="Arial"/>
+              <a:buNone/>
+            </a:pPr>
+            <a:r>
+              <a:rPr lang="en">
+                <a:solidFill>
+                  <a:schemeClr val="dk1"/>
+                </a:solidFill>
+              </a:rPr>
+              <a:t>5 - Day Dream Library </a:t>
+            </a:r>
+            <a:endParaRPr/>
+          </a:p>
+        </p:txBody>
+      </p:sp>
+    </p:spTree>
+  </p:cSld>
+  <p:clrMapOvr>
+    <a:masterClrMapping/>
+  </p:clrMapOvr>
+</p:notes>
+</file>
+
+<file path=ppt/notesSlides/notesSlide3.xml><?xml version="1.0" encoding="utf-8"?>
+<p:notes xmlns:a="http://schemas.openxmlformats.org/drawingml/2006/main" xmlns:r="http://schemas.openxmlformats.org/officeDocument/2006/relationships" xmlns:mc="http://schemas.openxmlformats.org/markup-compatibility/2006" xmlns:mv="urn:schemas-microsoft-com:mac:vml" xmlns:p="http://schemas.openxmlformats.org/presentationml/2006/main" xmlns:c="http://schemas.openxmlformats.org/drawingml/2006/chart" xmlns:dgm="http://schemas.openxmlformats.org/drawingml/2006/diagram" xmlns:o="urn:schemas-microsoft-com:office:office" xmlns:v="urn:schemas-microsoft-com:vml" xmlns:pvml="urn:schemas-microsoft-com:office:powerpoint" xmlns:com="http://schemas.openxmlformats.org/drawingml/2006/compatibility" xmlns:p14="http://schemas.microsoft.com/office/powerpoint/2010/main" xmlns:p15="http://schemas.microsoft.com/office/powerpoint/2012/main" xmlns:ahyp="http://schemas.microsoft.com/office/drawing/2018/hyperlinkcolor" showMasterPhAnim="0" showMasterSp="0">
+  <p:cSld>
+    <p:spTree>
+      <p:nvGrpSpPr>
+        <p:cNvPr id="60" name="Shape 60"/>
+        <p:cNvGrpSpPr/>
+        <p:nvPr/>
+      </p:nvGrpSpPr>
+      <p:grpSpPr>
+        <a:xfrm>
+          <a:off x="0" y="0"/>
+          <a:ext cx="0" cy="0"/>
+          <a:chOff x="0" y="0"/>
+          <a:chExt cx="0" cy="0"/>
+        </a:xfrm>
+      </p:grpSpPr>
+      <p:sp>
+        <p:nvSpPr>
+          <p:cNvPr id="61" name="Google Shape;61;g165300ffa59_0_6:notes"/>
+          <p:cNvSpPr/>
+          <p:nvPr>
+            <p:ph idx="2" type="sldImg"/>
+          </p:nvPr>
+        </p:nvSpPr>
+        <p:spPr>
+          <a:xfrm>
+            <a:off x="381300" y="685800"/>
+            <a:ext cx="6096000" cy="3429000"/>
+          </a:xfrm>
+          <a:custGeom>
+            <a:rect b="b" l="l" r="r" t="t"/>
+            <a:pathLst>
+              <a:path extrusionOk="0" h="120000" w="120000">
+                <a:moveTo>
+                  <a:pt x="0" y="0"/>
+                </a:moveTo>
+                <a:lnTo>
+                  <a:pt x="120000" y="0"/>
+                </a:lnTo>
+                <a:lnTo>
+                  <a:pt x="120000" y="120000"/>
+                </a:lnTo>
+                <a:lnTo>
+                  <a:pt x="0" y="120000"/>
+                </a:lnTo>
+                <a:close/>
+              </a:path>
+            </a:pathLst>
+          </a:custGeom>
+        </p:spPr>
+      </p:sp>
+      <p:sp>
+        <p:nvSpPr>
+          <p:cNvPr id="62" name="Google Shape;62;g165300ffa59_0_6:notes"/>
+          <p:cNvSpPr txBox="1"/>
+          <p:nvPr>
+            <p:ph idx="1" type="body"/>
+          </p:nvPr>
+        </p:nvSpPr>
+        <p:spPr>
+          <a:xfrm>
+            <a:off x="685800" y="4343400"/>
+            <a:ext cx="5486400" cy="4114800"/>
+          </a:xfrm>
+          <a:prstGeom prst="rect">
+            <a:avLst/>
+          </a:prstGeom>
+        </p:spPr>
+        <p:txBody>
+          <a:bodyPr anchorCtr="0" anchor="t" bIns="91425" lIns="91425" spcFirstLastPara="1" rIns="91425" wrap="square" tIns="91425">
+            <a:noAutofit/>
+          </a:bodyPr>
+          <a:lstStyle/>
+          <a:p>
+            <a:pPr indent="0" lvl="0" marL="0" rtl="0" algn="l">
+              <a:spcBef>
+                <a:spcPts val="0"/>
+              </a:spcBef>
+              <a:spcAft>
+                <a:spcPts val="0"/>
+              </a:spcAft>
+              <a:buClr>
+                <a:schemeClr val="dk1"/>
+              </a:buClr>
+              <a:buSzPts val="1100"/>
+              <a:buFont typeface="Arial"/>
+              <a:buNone/>
+            </a:pPr>
+            <a:r>
+              <a:rPr lang="en">
+                <a:solidFill>
+                  <a:schemeClr val="dk1"/>
+                </a:solidFill>
+              </a:rPr>
+              <a:t>1 - Town Square</a:t>
+            </a:r>
+            <a:endParaRPr>
+              <a:solidFill>
+                <a:schemeClr val="dk1"/>
+              </a:solidFill>
+            </a:endParaRPr>
+          </a:p>
+          <a:p>
+            <a:pPr indent="0" lvl="0" marL="0" rtl="0" algn="l">
+              <a:spcBef>
+                <a:spcPts val="0"/>
+              </a:spcBef>
+              <a:spcAft>
+                <a:spcPts val="0"/>
+              </a:spcAft>
+              <a:buClr>
+                <a:schemeClr val="dk1"/>
+              </a:buClr>
+              <a:buSzPts val="1100"/>
+              <a:buFont typeface="Arial"/>
+              <a:buNone/>
+            </a:pPr>
+            <a:r>
+              <a:rPr lang="en">
+                <a:solidFill>
+                  <a:schemeClr val="dk1"/>
+                </a:solidFill>
+              </a:rPr>
+              <a:t>2 - The Moon Market</a:t>
+            </a:r>
+            <a:endParaRPr>
+              <a:solidFill>
+                <a:schemeClr val="dk1"/>
+              </a:solidFill>
+            </a:endParaRPr>
+          </a:p>
+          <a:p>
+            <a:pPr indent="0" lvl="0" marL="0" rtl="0" algn="l">
+              <a:spcBef>
+                <a:spcPts val="0"/>
+              </a:spcBef>
+              <a:spcAft>
+                <a:spcPts val="0"/>
+              </a:spcAft>
+              <a:buClr>
+                <a:schemeClr val="dk1"/>
+              </a:buClr>
+              <a:buSzPts val="1100"/>
+              <a:buFont typeface="Arial"/>
+              <a:buNone/>
+            </a:pPr>
+            <a:r>
+              <a:rPr lang="en">
+                <a:solidFill>
+                  <a:schemeClr val="dk1"/>
+                </a:solidFill>
+              </a:rPr>
+              <a:t>3 - The Thoughtful Baker Bar</a:t>
+            </a:r>
+            <a:endParaRPr>
+              <a:solidFill>
+                <a:schemeClr val="dk1"/>
+              </a:solidFill>
+            </a:endParaRPr>
+          </a:p>
+          <a:p>
+            <a:pPr indent="0" lvl="0" marL="0" rtl="0" algn="l">
+              <a:spcBef>
+                <a:spcPts val="0"/>
+              </a:spcBef>
+              <a:spcAft>
+                <a:spcPts val="0"/>
+              </a:spcAft>
+              <a:buClr>
+                <a:schemeClr val="dk1"/>
+              </a:buClr>
+              <a:buSzPts val="1100"/>
+              <a:buFont typeface="Arial"/>
+              <a:buNone/>
+            </a:pPr>
+            <a:r>
+              <a:rPr lang="en">
+                <a:solidFill>
+                  <a:schemeClr val="dk1"/>
+                </a:solidFill>
+              </a:rPr>
+              <a:t>4 - The Flowing Hammer</a:t>
+            </a:r>
+            <a:endParaRPr>
+              <a:solidFill>
+                <a:schemeClr val="dk1"/>
+              </a:solidFill>
+            </a:endParaRPr>
+          </a:p>
+          <a:p>
+            <a:pPr indent="0" lvl="0" marL="0" rtl="0" algn="l">
+              <a:spcBef>
+                <a:spcPts val="0"/>
+              </a:spcBef>
+              <a:spcAft>
+                <a:spcPts val="0"/>
+              </a:spcAft>
+              <a:buClr>
+                <a:schemeClr val="dk1"/>
+              </a:buClr>
+              <a:buSzPts val="1100"/>
+              <a:buFont typeface="Arial"/>
+              <a:buNone/>
+            </a:pPr>
+            <a:r>
+              <a:rPr lang="en">
+                <a:solidFill>
+                  <a:schemeClr val="dk1"/>
+                </a:solidFill>
+              </a:rPr>
+              <a:t>5 - Day Dream Library </a:t>
+            </a:r>
+            <a:endParaRPr/>
+          </a:p>
+        </p:txBody>
+      </p:sp>
+    </p:spTree>
+  </p:cSld>
+  <p:clrMapOvr>
+    <a:masterClrMapping/>
+  </p:clrMapOvr>
+</p:notes>
+</file>
+
+<file path=ppt/notesSlides/notesSlide4.xml><?xml version="1.0" encoding="utf-8"?>
+<p:notes xmlns:a="http://schemas.openxmlformats.org/drawingml/2006/main" xmlns:r="http://schemas.openxmlformats.org/officeDocument/2006/relationships" xmlns:mc="http://schemas.openxmlformats.org/markup-compatibility/2006" xmlns:mv="urn:schemas-microsoft-com:mac:vml" xmlns:p="http://schemas.openxmlformats.org/presentationml/2006/main" xmlns:c="http://schemas.openxmlformats.org/drawingml/2006/chart" xmlns:dgm="http://schemas.openxmlformats.org/drawingml/2006/diagram" xmlns:o="urn:schemas-microsoft-com:office:office" xmlns:v="urn:schemas-microsoft-com:vml" xmlns:pvml="urn:schemas-microsoft-com:office:powerpoint" xmlns:com="http://schemas.openxmlformats.org/drawingml/2006/compatibility" xmlns:p14="http://schemas.microsoft.com/office/powerpoint/2010/main" xmlns:p15="http://schemas.microsoft.com/office/powerpoint/2012/main" xmlns:ahyp="http://schemas.microsoft.com/office/drawing/2018/hyperlinkcolor" showMasterPhAnim="0" showMasterSp="0">
+  <p:cSld>
+    <p:spTree>
+      <p:nvGrpSpPr>
+        <p:cNvPr id="65" name="Shape 65"/>
+        <p:cNvGrpSpPr/>
+        <p:nvPr/>
+      </p:nvGrpSpPr>
+      <p:grpSpPr>
+        <a:xfrm>
+          <a:off x="0" y="0"/>
+          <a:ext cx="0" cy="0"/>
+          <a:chOff x="0" y="0"/>
+          <a:chExt cx="0" cy="0"/>
+        </a:xfrm>
+      </p:grpSpPr>
+      <p:sp>
+        <p:nvSpPr>
+          <p:cNvPr id="66" name="Google Shape;66;g165300ffa59_0_12:notes"/>
+          <p:cNvSpPr/>
+          <p:nvPr>
+            <p:ph idx="2" type="sldImg"/>
+          </p:nvPr>
+        </p:nvSpPr>
+        <p:spPr>
+          <a:xfrm>
+            <a:off x="381300" y="685800"/>
+            <a:ext cx="6096000" cy="3429000"/>
+          </a:xfrm>
+          <a:custGeom>
+            <a:rect b="b" l="l" r="r" t="t"/>
+            <a:pathLst>
+              <a:path extrusionOk="0" h="120000" w="120000">
+                <a:moveTo>
+                  <a:pt x="0" y="0"/>
+                </a:moveTo>
+                <a:lnTo>
+                  <a:pt x="120000" y="0"/>
+                </a:lnTo>
+                <a:lnTo>
+                  <a:pt x="120000" y="120000"/>
+                </a:lnTo>
+                <a:lnTo>
+                  <a:pt x="0" y="120000"/>
+                </a:lnTo>
+                <a:close/>
+              </a:path>
+            </a:pathLst>
+          </a:custGeom>
+        </p:spPr>
+      </p:sp>
+      <p:sp>
+        <p:nvSpPr>
+          <p:cNvPr id="67" name="Google Shape;67;g165300ffa59_0_12:notes"/>
+          <p:cNvSpPr txBox="1"/>
+          <p:nvPr>
+            <p:ph idx="1" type="body"/>
+          </p:nvPr>
+        </p:nvSpPr>
+        <p:spPr>
+          <a:xfrm>
+            <a:off x="685800" y="4343400"/>
+            <a:ext cx="5486400" cy="4114800"/>
+          </a:xfrm>
+          <a:prstGeom prst="rect">
+            <a:avLst/>
+          </a:prstGeom>
+        </p:spPr>
+        <p:txBody>
+          <a:bodyPr anchorCtr="0" anchor="t" bIns="91425" lIns="91425" spcFirstLastPara="1" rIns="91425" wrap="square" tIns="91425">
+            <a:noAutofit/>
+          </a:bodyPr>
+          <a:lstStyle/>
+          <a:p>
+            <a:pPr indent="0" lvl="0" marL="0" rtl="0" algn="l">
+              <a:spcBef>
+                <a:spcPts val="0"/>
+              </a:spcBef>
+              <a:spcAft>
+                <a:spcPts val="0"/>
+              </a:spcAft>
+              <a:buClr>
+                <a:schemeClr val="dk1"/>
+              </a:buClr>
+              <a:buSzPts val="1100"/>
+              <a:buFont typeface="Arial"/>
+              <a:buNone/>
+            </a:pPr>
+            <a:r>
+              <a:rPr lang="en">
+                <a:solidFill>
+                  <a:schemeClr val="dk1"/>
+                </a:solidFill>
+              </a:rPr>
+              <a:t>1 - Town Square</a:t>
+            </a:r>
+            <a:endParaRPr>
+              <a:solidFill>
+                <a:schemeClr val="dk1"/>
+              </a:solidFill>
+            </a:endParaRPr>
+          </a:p>
+          <a:p>
+            <a:pPr indent="0" lvl="0" marL="0" rtl="0" algn="l">
+              <a:spcBef>
+                <a:spcPts val="0"/>
+              </a:spcBef>
+              <a:spcAft>
+                <a:spcPts val="0"/>
+              </a:spcAft>
+              <a:buClr>
+                <a:schemeClr val="dk1"/>
+              </a:buClr>
+              <a:buSzPts val="1100"/>
+              <a:buFont typeface="Arial"/>
+              <a:buNone/>
+            </a:pPr>
+            <a:r>
+              <a:rPr lang="en">
+                <a:solidFill>
+                  <a:schemeClr val="dk1"/>
+                </a:solidFill>
+              </a:rPr>
+              <a:t>2 - The Moon Market</a:t>
+            </a:r>
+            <a:endParaRPr>
+              <a:solidFill>
+                <a:schemeClr val="dk1"/>
+              </a:solidFill>
+            </a:endParaRPr>
+          </a:p>
+          <a:p>
+            <a:pPr indent="0" lvl="0" marL="0" rtl="0" algn="l">
+              <a:spcBef>
+                <a:spcPts val="0"/>
+              </a:spcBef>
+              <a:spcAft>
+                <a:spcPts val="0"/>
+              </a:spcAft>
+              <a:buClr>
+                <a:schemeClr val="dk1"/>
+              </a:buClr>
+              <a:buSzPts val="1100"/>
+              <a:buFont typeface="Arial"/>
+              <a:buNone/>
+            </a:pPr>
+            <a:r>
+              <a:rPr lang="en">
+                <a:solidFill>
+                  <a:schemeClr val="dk1"/>
+                </a:solidFill>
+              </a:rPr>
+              <a:t>3 - The Thoughtful Baker Bar</a:t>
+            </a:r>
+            <a:endParaRPr>
+              <a:solidFill>
+                <a:schemeClr val="dk1"/>
+              </a:solidFill>
+            </a:endParaRPr>
+          </a:p>
+          <a:p>
+            <a:pPr indent="0" lvl="0" marL="0" rtl="0" algn="l">
+              <a:spcBef>
+                <a:spcPts val="0"/>
+              </a:spcBef>
+              <a:spcAft>
+                <a:spcPts val="0"/>
+              </a:spcAft>
+              <a:buClr>
+                <a:schemeClr val="dk1"/>
+              </a:buClr>
+              <a:buSzPts val="1100"/>
+              <a:buFont typeface="Arial"/>
+              <a:buNone/>
+            </a:pPr>
+            <a:r>
+              <a:rPr lang="en">
+                <a:solidFill>
+                  <a:schemeClr val="dk1"/>
+                </a:solidFill>
+              </a:rPr>
+              <a:t>4 - The Flowing Hammer</a:t>
+            </a:r>
+            <a:endParaRPr>
+              <a:solidFill>
+                <a:schemeClr val="dk1"/>
+              </a:solidFill>
+            </a:endParaRPr>
+          </a:p>
+          <a:p>
+            <a:pPr indent="0" lvl="0" marL="0" rtl="0" algn="l">
+              <a:spcBef>
+                <a:spcPts val="0"/>
+              </a:spcBef>
+              <a:spcAft>
+                <a:spcPts val="0"/>
+              </a:spcAft>
+              <a:buClr>
+                <a:schemeClr val="dk1"/>
+              </a:buClr>
+              <a:buSzPts val="1100"/>
+              <a:buFont typeface="Arial"/>
+              <a:buNone/>
+            </a:pPr>
+            <a:r>
+              <a:rPr lang="en">
+                <a:solidFill>
+                  <a:schemeClr val="dk1"/>
+                </a:solidFill>
+              </a:rPr>
+              <a:t>5 - Day Dream Library </a:t>
+            </a:r>
+            <a:endParaRPr/>
+          </a:p>
+        </p:txBody>
+      </p:sp>
+    </p:spTree>
+  </p:cSld>
+  <p:clrMapOvr>
+    <a:masterClrMapping/>
+  </p:clrMapOvr>
+</p:notes>
+</file>
+
+<file path=ppt/notesSlides/notesSlide5.xml><?xml version="1.0" encoding="utf-8"?>
+<p:notes xmlns:a="http://schemas.openxmlformats.org/drawingml/2006/main" xmlns:r="http://schemas.openxmlformats.org/officeDocument/2006/relationships" xmlns:mc="http://schemas.openxmlformats.org/markup-compatibility/2006" xmlns:mv="urn:schemas-microsoft-com:mac:vml" xmlns:p="http://schemas.openxmlformats.org/presentationml/2006/main" xmlns:c="http://schemas.openxmlformats.org/drawingml/2006/chart" xmlns:dgm="http://schemas.openxmlformats.org/drawingml/2006/diagram" xmlns:o="urn:schemas-microsoft-com:office:office" xmlns:v="urn:schemas-microsoft-com:vml" xmlns:pvml="urn:schemas-microsoft-com:office:powerpoint" xmlns:com="http://schemas.openxmlformats.org/drawingml/2006/compatibility" xmlns:p14="http://schemas.microsoft.com/office/powerpoint/2010/main" xmlns:p15="http://schemas.microsoft.com/office/powerpoint/2012/main" xmlns:ahyp="http://schemas.microsoft.com/office/drawing/2018/hyperlinkcolor" showMasterPhAnim="0" showMasterSp="0">
+  <p:cSld>
+    <p:spTree>
+      <p:nvGrpSpPr>
+        <p:cNvPr id="70" name="Shape 70"/>
+        <p:cNvGrpSpPr/>
+        <p:nvPr/>
+      </p:nvGrpSpPr>
+      <p:grpSpPr>
+        <a:xfrm>
+          <a:off x="0" y="0"/>
+          <a:ext cx="0" cy="0"/>
+          <a:chOff x="0" y="0"/>
+          <a:chExt cx="0" cy="0"/>
+        </a:xfrm>
+      </p:grpSpPr>
+      <p:sp>
+        <p:nvSpPr>
+          <p:cNvPr id="71" name="Google Shape;71;g165300ffa59_0_18:notes"/>
+          <p:cNvSpPr/>
+          <p:nvPr>
+            <p:ph idx="2" type="sldImg"/>
+          </p:nvPr>
+        </p:nvSpPr>
+        <p:spPr>
+          <a:xfrm>
+            <a:off x="381300" y="685800"/>
+            <a:ext cx="6096000" cy="3429000"/>
+          </a:xfrm>
+          <a:custGeom>
+            <a:rect b="b" l="l" r="r" t="t"/>
+            <a:pathLst>
+              <a:path extrusionOk="0" h="120000" w="120000">
+                <a:moveTo>
+                  <a:pt x="0" y="0"/>
+                </a:moveTo>
+                <a:lnTo>
+                  <a:pt x="120000" y="0"/>
+                </a:lnTo>
+                <a:lnTo>
+                  <a:pt x="120000" y="120000"/>
+                </a:lnTo>
+                <a:lnTo>
+                  <a:pt x="0" y="120000"/>
+                </a:lnTo>
+                <a:close/>
+              </a:path>
+            </a:pathLst>
+          </a:custGeom>
+        </p:spPr>
+      </p:sp>
+      <p:sp>
+        <p:nvSpPr>
+          <p:cNvPr id="72" name="Google Shape;72;g165300ffa59_0_18:notes"/>
+          <p:cNvSpPr txBox="1"/>
+          <p:nvPr>
+            <p:ph idx="1" type="body"/>
+          </p:nvPr>
+        </p:nvSpPr>
+        <p:spPr>
+          <a:xfrm>
+            <a:off x="685800" y="4343400"/>
+            <a:ext cx="5486400" cy="4114800"/>
+          </a:xfrm>
+          <a:prstGeom prst="rect">
+            <a:avLst/>
+          </a:prstGeom>
+        </p:spPr>
+        <p:txBody>
+          <a:bodyPr anchorCtr="0" anchor="t" bIns="91425" lIns="91425" spcFirstLastPara="1" rIns="91425" wrap="square" tIns="91425">
+            <a:noAutofit/>
+          </a:bodyPr>
+          <a:lstStyle/>
+          <a:p>
+            <a:pPr indent="0" lvl="0" marL="0" rtl="0" algn="l">
+              <a:spcBef>
+                <a:spcPts val="0"/>
+              </a:spcBef>
+              <a:spcAft>
+                <a:spcPts val="0"/>
+              </a:spcAft>
+              <a:buClr>
+                <a:schemeClr val="dk1"/>
+              </a:buClr>
+              <a:buSzPts val="1100"/>
+              <a:buFont typeface="Arial"/>
+              <a:buNone/>
+            </a:pPr>
+            <a:r>
+              <a:rPr lang="en">
+                <a:solidFill>
+                  <a:schemeClr val="dk1"/>
+                </a:solidFill>
+              </a:rPr>
+              <a:t>1 - Town Square</a:t>
+            </a:r>
+            <a:endParaRPr>
+              <a:solidFill>
+                <a:schemeClr val="dk1"/>
+              </a:solidFill>
+            </a:endParaRPr>
+          </a:p>
+          <a:p>
+            <a:pPr indent="0" lvl="0" marL="0" rtl="0" algn="l">
+              <a:spcBef>
+                <a:spcPts val="0"/>
+              </a:spcBef>
+              <a:spcAft>
+                <a:spcPts val="0"/>
+              </a:spcAft>
+              <a:buClr>
+                <a:schemeClr val="dk1"/>
+              </a:buClr>
+              <a:buSzPts val="1100"/>
+              <a:buFont typeface="Arial"/>
+              <a:buNone/>
+            </a:pPr>
+            <a:r>
+              <a:rPr lang="en">
+                <a:solidFill>
+                  <a:schemeClr val="dk1"/>
+                </a:solidFill>
+              </a:rPr>
+              <a:t>2 - The Moon Market</a:t>
+            </a:r>
+            <a:endParaRPr>
+              <a:solidFill>
+                <a:schemeClr val="dk1"/>
+              </a:solidFill>
+            </a:endParaRPr>
+          </a:p>
+          <a:p>
+            <a:pPr indent="0" lvl="0" marL="0" rtl="0" algn="l">
+              <a:spcBef>
+                <a:spcPts val="0"/>
+              </a:spcBef>
+              <a:spcAft>
+                <a:spcPts val="0"/>
+              </a:spcAft>
+              <a:buClr>
+                <a:schemeClr val="dk1"/>
+              </a:buClr>
+              <a:buSzPts val="1100"/>
+              <a:buFont typeface="Arial"/>
+              <a:buNone/>
+            </a:pPr>
+            <a:r>
+              <a:rPr lang="en">
+                <a:solidFill>
+                  <a:schemeClr val="dk1"/>
+                </a:solidFill>
+              </a:rPr>
+              <a:t>3 - The Thoughtful Baker Bar</a:t>
+            </a:r>
+            <a:endParaRPr>
+              <a:solidFill>
+                <a:schemeClr val="dk1"/>
+              </a:solidFill>
+            </a:endParaRPr>
+          </a:p>
+          <a:p>
+            <a:pPr indent="0" lvl="0" marL="0" rtl="0" algn="l">
+              <a:spcBef>
+                <a:spcPts val="0"/>
+              </a:spcBef>
+              <a:spcAft>
+                <a:spcPts val="0"/>
+              </a:spcAft>
+              <a:buClr>
+                <a:schemeClr val="dk1"/>
+              </a:buClr>
+              <a:buSzPts val="1100"/>
+              <a:buFont typeface="Arial"/>
+              <a:buNone/>
+            </a:pPr>
+            <a:r>
+              <a:rPr lang="en">
+                <a:solidFill>
+                  <a:schemeClr val="dk1"/>
+                </a:solidFill>
+              </a:rPr>
+              <a:t>4 - The Flowing Hammer</a:t>
+            </a:r>
+            <a:endParaRPr>
+              <a:solidFill>
+                <a:schemeClr val="dk1"/>
+              </a:solidFill>
+            </a:endParaRPr>
+          </a:p>
+          <a:p>
+            <a:pPr indent="0" lvl="0" marL="0" rtl="0" algn="l">
+              <a:spcBef>
+                <a:spcPts val="0"/>
+              </a:spcBef>
+              <a:spcAft>
+                <a:spcPts val="0"/>
+              </a:spcAft>
+              <a:buClr>
+                <a:schemeClr val="dk1"/>
+              </a:buClr>
+              <a:buSzPts val="1100"/>
+              <a:buFont typeface="Arial"/>
+              <a:buNone/>
+            </a:pPr>
+            <a:r>
+              <a:rPr lang="en">
+                <a:solidFill>
+                  <a:schemeClr val="dk1"/>
+                </a:solidFill>
+              </a:rPr>
+              <a:t>5 - Day Dream Library </a:t>
             </a:r>
             <a:endParaRPr/>
           </a:p>
@@ -5683,8 +6552,166 @@
         </p:blipFill>
         <p:spPr>
           <a:xfrm>
-            <a:off x="-502100" y="-1695725"/>
-            <a:ext cx="10148199" cy="6839234"/>
+            <a:off x="0" y="0"/>
+            <a:ext cx="9143998" cy="5146765"/>
+          </a:xfrm>
+          <a:prstGeom prst="rect">
+            <a:avLst/>
+          </a:prstGeom>
+          <a:noFill/>
+          <a:ln>
+            <a:noFill/>
+          </a:ln>
+        </p:spPr>
+      </p:pic>
+    </p:spTree>
+  </p:cSld>
+  <p:clrMapOvr>
+    <a:masterClrMapping/>
+  </p:clrMapOvr>
+</p:sld>
+</file>
+
+<file path=ppt/slides/slide3.xml><?xml version="1.0" encoding="utf-8"?>
+<p:sld xmlns:a="http://schemas.openxmlformats.org/drawingml/2006/main" xmlns:r="http://schemas.openxmlformats.org/officeDocument/2006/relationships" xmlns:mc="http://schemas.openxmlformats.org/markup-compatibility/2006" xmlns:mv="urn:schemas-microsoft-com:mac:vml" xmlns:p="http://schemas.openxmlformats.org/presentationml/2006/main" xmlns:c="http://schemas.openxmlformats.org/drawingml/2006/chart" xmlns:dgm="http://schemas.openxmlformats.org/drawingml/2006/diagram" xmlns:o="urn:schemas-microsoft-com:office:office" xmlns:v="urn:schemas-microsoft-com:vml" xmlns:pvml="urn:schemas-microsoft-com:office:powerpoint" xmlns:com="http://schemas.openxmlformats.org/drawingml/2006/compatibility" xmlns:p14="http://schemas.microsoft.com/office/powerpoint/2010/main" xmlns:p15="http://schemas.microsoft.com/office/powerpoint/2012/main" xmlns:ahyp="http://schemas.microsoft.com/office/drawing/2018/hyperlinkcolor">
+  <p:cSld>
+    <p:spTree>
+      <p:nvGrpSpPr>
+        <p:cNvPr id="63" name="Shape 63"/>
+        <p:cNvGrpSpPr/>
+        <p:nvPr/>
+      </p:nvGrpSpPr>
+      <p:grpSpPr>
+        <a:xfrm>
+          <a:off x="0" y="0"/>
+          <a:ext cx="0" cy="0"/>
+          <a:chOff x="0" y="0"/>
+          <a:chExt cx="0" cy="0"/>
+        </a:xfrm>
+      </p:grpSpPr>
+      <p:pic>
+        <p:nvPicPr>
+          <p:cNvPr id="64" name="Google Shape;64;p15"/>
+          <p:cNvPicPr preferRelativeResize="0"/>
+          <p:nvPr/>
+        </p:nvPicPr>
+        <p:blipFill>
+          <a:blip r:embed="rId3">
+            <a:alphaModFix/>
+          </a:blip>
+          <a:stretch>
+            <a:fillRect/>
+          </a:stretch>
+        </p:blipFill>
+        <p:spPr>
+          <a:xfrm>
+            <a:off x="-117125" y="0"/>
+            <a:ext cx="10163789" cy="5143500"/>
+          </a:xfrm>
+          <a:prstGeom prst="rect">
+            <a:avLst/>
+          </a:prstGeom>
+          <a:noFill/>
+          <a:ln>
+            <a:noFill/>
+          </a:ln>
+        </p:spPr>
+      </p:pic>
+    </p:spTree>
+  </p:cSld>
+  <p:clrMapOvr>
+    <a:masterClrMapping/>
+  </p:clrMapOvr>
+</p:sld>
+</file>
+
+<file path=ppt/slides/slide4.xml><?xml version="1.0" encoding="utf-8"?>
+<p:sld xmlns:a="http://schemas.openxmlformats.org/drawingml/2006/main" xmlns:r="http://schemas.openxmlformats.org/officeDocument/2006/relationships" xmlns:mc="http://schemas.openxmlformats.org/markup-compatibility/2006" xmlns:mv="urn:schemas-microsoft-com:mac:vml" xmlns:p="http://schemas.openxmlformats.org/presentationml/2006/main" xmlns:c="http://schemas.openxmlformats.org/drawingml/2006/chart" xmlns:dgm="http://schemas.openxmlformats.org/drawingml/2006/diagram" xmlns:o="urn:schemas-microsoft-com:office:office" xmlns:v="urn:schemas-microsoft-com:vml" xmlns:pvml="urn:schemas-microsoft-com:office:powerpoint" xmlns:com="http://schemas.openxmlformats.org/drawingml/2006/compatibility" xmlns:p14="http://schemas.microsoft.com/office/powerpoint/2010/main" xmlns:p15="http://schemas.microsoft.com/office/powerpoint/2012/main" xmlns:ahyp="http://schemas.microsoft.com/office/drawing/2018/hyperlinkcolor">
+  <p:cSld>
+    <p:spTree>
+      <p:nvGrpSpPr>
+        <p:cNvPr id="68" name="Shape 68"/>
+        <p:cNvGrpSpPr/>
+        <p:nvPr/>
+      </p:nvGrpSpPr>
+      <p:grpSpPr>
+        <a:xfrm>
+          <a:off x="0" y="0"/>
+          <a:ext cx="0" cy="0"/>
+          <a:chOff x="0" y="0"/>
+          <a:chExt cx="0" cy="0"/>
+        </a:xfrm>
+      </p:grpSpPr>
+      <p:pic>
+        <p:nvPicPr>
+          <p:cNvPr id="69" name="Google Shape;69;p16"/>
+          <p:cNvPicPr preferRelativeResize="0"/>
+          <p:nvPr/>
+        </p:nvPicPr>
+        <p:blipFill>
+          <a:blip r:embed="rId3">
+            <a:alphaModFix/>
+          </a:blip>
+          <a:stretch>
+            <a:fillRect/>
+          </a:stretch>
+        </p:blipFill>
+        <p:spPr>
+          <a:xfrm>
+            <a:off x="0" y="0"/>
+            <a:ext cx="9446800" cy="5309100"/>
+          </a:xfrm>
+          <a:prstGeom prst="rect">
+            <a:avLst/>
+          </a:prstGeom>
+          <a:noFill/>
+          <a:ln>
+            <a:noFill/>
+          </a:ln>
+        </p:spPr>
+      </p:pic>
+    </p:spTree>
+  </p:cSld>
+  <p:clrMapOvr>
+    <a:masterClrMapping/>
+  </p:clrMapOvr>
+</p:sld>
+</file>
+
+<file path=ppt/slides/slide5.xml><?xml version="1.0" encoding="utf-8"?>
+<p:sld xmlns:a="http://schemas.openxmlformats.org/drawingml/2006/main" xmlns:r="http://schemas.openxmlformats.org/officeDocument/2006/relationships" xmlns:mc="http://schemas.openxmlformats.org/markup-compatibility/2006" xmlns:mv="urn:schemas-microsoft-com:mac:vml" xmlns:p="http://schemas.openxmlformats.org/presentationml/2006/main" xmlns:c="http://schemas.openxmlformats.org/drawingml/2006/chart" xmlns:dgm="http://schemas.openxmlformats.org/drawingml/2006/diagram" xmlns:o="urn:schemas-microsoft-com:office:office" xmlns:v="urn:schemas-microsoft-com:vml" xmlns:pvml="urn:schemas-microsoft-com:office:powerpoint" xmlns:com="http://schemas.openxmlformats.org/drawingml/2006/compatibility" xmlns:p14="http://schemas.microsoft.com/office/powerpoint/2010/main" xmlns:p15="http://schemas.microsoft.com/office/powerpoint/2012/main" xmlns:ahyp="http://schemas.microsoft.com/office/drawing/2018/hyperlinkcolor">
+  <p:cSld>
+    <p:spTree>
+      <p:nvGrpSpPr>
+        <p:cNvPr id="73" name="Shape 73"/>
+        <p:cNvGrpSpPr/>
+        <p:nvPr/>
+      </p:nvGrpSpPr>
+      <p:grpSpPr>
+        <a:xfrm>
+          <a:off x="0" y="0"/>
+          <a:ext cx="0" cy="0"/>
+          <a:chOff x="0" y="0"/>
+          <a:chExt cx="0" cy="0"/>
+        </a:xfrm>
+      </p:grpSpPr>
+      <p:pic>
+        <p:nvPicPr>
+          <p:cNvPr id="74" name="Google Shape;74;p17"/>
+          <p:cNvPicPr preferRelativeResize="0"/>
+          <p:nvPr/>
+        </p:nvPicPr>
+        <p:blipFill rotWithShape="1">
+          <a:blip r:embed="rId3">
+            <a:alphaModFix/>
+          </a:blip>
+          <a:srcRect b="12742" l="0" r="0" t="12957"/>
+          <a:stretch/>
+        </p:blipFill>
+        <p:spPr>
+          <a:xfrm>
+            <a:off x="0" y="23863"/>
+            <a:ext cx="9144000" cy="5095771"/>
           </a:xfrm>
           <a:prstGeom prst="rect">
             <a:avLst/>

</xml_diff>